<commit_message>
Update HallymHackathon presentation file
</commit_message>
<xml_diff>
--- a/docs/HallymHackathon.pptx
+++ b/docs/HallymHackathon.pptx
@@ -4706,7 +4706,7 @@
         </p:blipFill>
         <p:spPr>
           <a:xfrm>
-            <a:off x="7777381" y="4354328"/>
+            <a:off x="7703808" y="3909670"/>
             <a:ext cx="2228805" cy="842221"/>
           </a:xfrm>
           <a:prstGeom prst="rect">
@@ -4983,6 +4983,66 @@
           <a:xfrm>
             <a:off x="8982733" y="2624658"/>
             <a:ext cx="1899760" cy="1166093"/>
+          </a:xfrm>
+          <a:prstGeom prst="rect">
+            <a:avLst/>
+          </a:prstGeom>
+        </p:spPr>
+      </p:pic>
+      <p:pic>
+        <p:nvPicPr>
+          <p:cNvPr id="5" name="그림 4" descr="다채로움, 그래픽, 창의성이(가) 표시된 사진&#10;&#10;AI 생성 콘텐츠는 정확하지 않을 수 있습니다.">
+            <a:extLst>
+              <a:ext uri="{FF2B5EF4-FFF2-40B4-BE49-F238E27FC236}">
+                <a16:creationId xmlns:a16="http://schemas.microsoft.com/office/drawing/2014/main" id="{1643C99A-5176-12F4-CD05-320EC080C59E}"/>
+              </a:ext>
+            </a:extLst>
+          </p:cNvPr>
+          <p:cNvPicPr>
+            <a:picLocks noChangeAspect="1"/>
+          </p:cNvPicPr>
+          <p:nvPr/>
+        </p:nvPicPr>
+        <p:blipFill>
+          <a:blip r:embed="rId9"/>
+          <a:stretch>
+            <a:fillRect/>
+          </a:stretch>
+        </p:blipFill>
+        <p:spPr>
+          <a:xfrm>
+            <a:off x="7304404" y="4828911"/>
+            <a:ext cx="714886" cy="939327"/>
+          </a:xfrm>
+          <a:prstGeom prst="rect">
+            <a:avLst/>
+          </a:prstGeom>
+        </p:spPr>
+      </p:pic>
+      <p:pic>
+        <p:nvPicPr>
+          <p:cNvPr id="18" name="그림 17" descr="폰트, 로고, 그래픽, 텍스트이(가) 표시된 사진&#10;&#10;AI 생성 콘텐츠는 정확하지 않을 수 있습니다.">
+            <a:extLst>
+              <a:ext uri="{FF2B5EF4-FFF2-40B4-BE49-F238E27FC236}">
+                <a16:creationId xmlns:a16="http://schemas.microsoft.com/office/drawing/2014/main" id="{CDA4F897-BFB9-BF4A-252D-2CBE0BD02FF4}"/>
+              </a:ext>
+            </a:extLst>
+          </p:cNvPr>
+          <p:cNvPicPr>
+            <a:picLocks noChangeAspect="1"/>
+          </p:cNvPicPr>
+          <p:nvPr/>
+        </p:nvPicPr>
+        <p:blipFill>
+          <a:blip r:embed="rId10"/>
+          <a:stretch>
+            <a:fillRect/>
+          </a:stretch>
+        </p:blipFill>
+        <p:spPr>
+          <a:xfrm>
+            <a:off x="8653688" y="4937041"/>
+            <a:ext cx="2124675" cy="757310"/>
           </a:xfrm>
           <a:prstGeom prst="rect">
             <a:avLst/>

</xml_diff>

<commit_message>
Single schedule and location extraction completed successfully
</commit_message>
<xml_diff>
--- a/docs/HallymHackathon.pptx
+++ b/docs/HallymHackathon.pptx
@@ -262,7 +262,7 @@
           <a:p>
             <a:fld id="{BE516E25-678F-BC4C-A6D5-74022B6D308B}" type="datetimeFigureOut">
               <a:rPr kumimoji="1" lang="ko-KR" altLang="en-US" smtClean="0"/>
-              <a:t>2025. 7. 25.</a:t>
+              <a:t>2025. 7. 26.</a:t>
             </a:fld>
             <a:endParaRPr kumimoji="1" lang="ko-KR" altLang="en-US"/>
           </a:p>
@@ -460,7 +460,7 @@
           <a:p>
             <a:fld id="{BE516E25-678F-BC4C-A6D5-74022B6D308B}" type="datetimeFigureOut">
               <a:rPr kumimoji="1" lang="ko-KR" altLang="en-US" smtClean="0"/>
-              <a:t>2025. 7. 25.</a:t>
+              <a:t>2025. 7. 26.</a:t>
             </a:fld>
             <a:endParaRPr kumimoji="1" lang="ko-KR" altLang="en-US"/>
           </a:p>
@@ -668,7 +668,7 @@
           <a:p>
             <a:fld id="{BE516E25-678F-BC4C-A6D5-74022B6D308B}" type="datetimeFigureOut">
               <a:rPr kumimoji="1" lang="ko-KR" altLang="en-US" smtClean="0"/>
-              <a:t>2025. 7. 25.</a:t>
+              <a:t>2025. 7. 26.</a:t>
             </a:fld>
             <a:endParaRPr kumimoji="1" lang="ko-KR" altLang="en-US"/>
           </a:p>
@@ -866,7 +866,7 @@
           <a:p>
             <a:fld id="{BE516E25-678F-BC4C-A6D5-74022B6D308B}" type="datetimeFigureOut">
               <a:rPr kumimoji="1" lang="ko-KR" altLang="en-US" smtClean="0"/>
-              <a:t>2025. 7. 25.</a:t>
+              <a:t>2025. 7. 26.</a:t>
             </a:fld>
             <a:endParaRPr kumimoji="1" lang="ko-KR" altLang="en-US"/>
           </a:p>
@@ -1141,7 +1141,7 @@
           <a:p>
             <a:fld id="{BE516E25-678F-BC4C-A6D5-74022B6D308B}" type="datetimeFigureOut">
               <a:rPr kumimoji="1" lang="ko-KR" altLang="en-US" smtClean="0"/>
-              <a:t>2025. 7. 25.</a:t>
+              <a:t>2025. 7. 26.</a:t>
             </a:fld>
             <a:endParaRPr kumimoji="1" lang="ko-KR" altLang="en-US"/>
           </a:p>
@@ -1406,7 +1406,7 @@
           <a:p>
             <a:fld id="{BE516E25-678F-BC4C-A6D5-74022B6D308B}" type="datetimeFigureOut">
               <a:rPr kumimoji="1" lang="ko-KR" altLang="en-US" smtClean="0"/>
-              <a:t>2025. 7. 25.</a:t>
+              <a:t>2025. 7. 26.</a:t>
             </a:fld>
             <a:endParaRPr kumimoji="1" lang="ko-KR" altLang="en-US"/>
           </a:p>
@@ -1818,7 +1818,7 @@
           <a:p>
             <a:fld id="{BE516E25-678F-BC4C-A6D5-74022B6D308B}" type="datetimeFigureOut">
               <a:rPr kumimoji="1" lang="ko-KR" altLang="en-US" smtClean="0"/>
-              <a:t>2025. 7. 25.</a:t>
+              <a:t>2025. 7. 26.</a:t>
             </a:fld>
             <a:endParaRPr kumimoji="1" lang="ko-KR" altLang="en-US"/>
           </a:p>
@@ -1959,7 +1959,7 @@
           <a:p>
             <a:fld id="{BE516E25-678F-BC4C-A6D5-74022B6D308B}" type="datetimeFigureOut">
               <a:rPr kumimoji="1" lang="ko-KR" altLang="en-US" smtClean="0"/>
-              <a:t>2025. 7. 25.</a:t>
+              <a:t>2025. 7. 26.</a:t>
             </a:fld>
             <a:endParaRPr kumimoji="1" lang="ko-KR" altLang="en-US"/>
           </a:p>
@@ -2072,7 +2072,7 @@
           <a:p>
             <a:fld id="{BE516E25-678F-BC4C-A6D5-74022B6D308B}" type="datetimeFigureOut">
               <a:rPr kumimoji="1" lang="ko-KR" altLang="en-US" smtClean="0"/>
-              <a:t>2025. 7. 25.</a:t>
+              <a:t>2025. 7. 26.</a:t>
             </a:fld>
             <a:endParaRPr kumimoji="1" lang="ko-KR" altLang="en-US"/>
           </a:p>
@@ -2383,7 +2383,7 @@
           <a:p>
             <a:fld id="{BE516E25-678F-BC4C-A6D5-74022B6D308B}" type="datetimeFigureOut">
               <a:rPr kumimoji="1" lang="ko-KR" altLang="en-US" smtClean="0"/>
-              <a:t>2025. 7. 25.</a:t>
+              <a:t>2025. 7. 26.</a:t>
             </a:fld>
             <a:endParaRPr kumimoji="1" lang="ko-KR" altLang="en-US"/>
           </a:p>
@@ -2671,7 +2671,7 @@
           <a:p>
             <a:fld id="{BE516E25-678F-BC4C-A6D5-74022B6D308B}" type="datetimeFigureOut">
               <a:rPr kumimoji="1" lang="ko-KR" altLang="en-US" smtClean="0"/>
-              <a:t>2025. 7. 25.</a:t>
+              <a:t>2025. 7. 26.</a:t>
             </a:fld>
             <a:endParaRPr kumimoji="1" lang="ko-KR" altLang="en-US"/>
           </a:p>
@@ -2912,7 +2912,7 @@
           <a:p>
             <a:fld id="{BE516E25-678F-BC4C-A6D5-74022B6D308B}" type="datetimeFigureOut">
               <a:rPr kumimoji="1" lang="ko-KR" altLang="en-US" smtClean="0"/>
-              <a:t>2025. 7. 25.</a:t>
+              <a:t>2025. 7. 26.</a:t>
             </a:fld>
             <a:endParaRPr kumimoji="1" lang="ko-KR" altLang="en-US"/>
           </a:p>
@@ -4728,8 +4728,8 @@
         </p:nvSpPr>
         <p:spPr>
           <a:xfrm>
-            <a:off x="1375227" y="3813803"/>
-            <a:ext cx="1460090" cy="1643099"/>
+            <a:off x="1412841" y="3612859"/>
+            <a:ext cx="3108681" cy="894602"/>
           </a:xfrm>
           <a:prstGeom prst="roundRect">
             <a:avLst/>
@@ -4764,7 +4764,6 @@
           <a:bodyPr rtlCol="0" anchor="ctr"/>
           <a:lstStyle/>
           <a:p>
-            <a:pPr algn="ctr"/>
             <a:r>
               <a:rPr kumimoji="1" lang="en-US" altLang="ko-KR" dirty="0">
                 <a:solidFill>
@@ -4774,38 +4773,6 @@
               <a:t>NLP</a:t>
             </a:r>
           </a:p>
-          <a:p>
-            <a:pPr algn="ctr"/>
-            <a:endParaRPr kumimoji="1" lang="en-US" altLang="ko-KR" dirty="0">
-              <a:solidFill>
-                <a:sysClr val="windowText" lastClr="000000"/>
-              </a:solidFill>
-            </a:endParaRPr>
-          </a:p>
-          <a:p>
-            <a:pPr algn="ctr"/>
-            <a:endParaRPr kumimoji="1" lang="en-US" altLang="ko-KR" dirty="0">
-              <a:solidFill>
-                <a:sysClr val="windowText" lastClr="000000"/>
-              </a:solidFill>
-            </a:endParaRPr>
-          </a:p>
-          <a:p>
-            <a:pPr algn="ctr"/>
-            <a:endParaRPr kumimoji="1" lang="en-US" altLang="ko-KR" dirty="0">
-              <a:solidFill>
-                <a:sysClr val="windowText" lastClr="000000"/>
-              </a:solidFill>
-            </a:endParaRPr>
-          </a:p>
-          <a:p>
-            <a:pPr algn="ctr"/>
-            <a:endParaRPr kumimoji="1" lang="ko-KR" altLang="en-US" dirty="0">
-              <a:solidFill>
-                <a:sysClr val="windowText" lastClr="000000"/>
-              </a:solidFill>
-            </a:endParaRPr>
-          </a:p>
         </p:txBody>
       </p:sp>
       <p:sp>
@@ -4822,8 +4789,8 @@
         </p:nvSpPr>
         <p:spPr>
           <a:xfrm>
-            <a:off x="3065862" y="3813803"/>
-            <a:ext cx="1460090" cy="1643099"/>
+            <a:off x="1412841" y="4780334"/>
+            <a:ext cx="3108681" cy="739933"/>
           </a:xfrm>
           <a:prstGeom prst="roundRect">
             <a:avLst/>
@@ -4855,7 +4822,6 @@
           <a:bodyPr rtlCol="0" anchor="ctr"/>
           <a:lstStyle/>
           <a:p>
-            <a:pPr algn="ctr"/>
             <a:r>
               <a:rPr kumimoji="1" lang="en-US" altLang="ko-KR" dirty="0">
                 <a:solidFill>
@@ -4865,46 +4831,14 @@
               <a:t>NER</a:t>
             </a:r>
           </a:p>
-          <a:p>
-            <a:pPr algn="ctr"/>
-            <a:endParaRPr kumimoji="1" lang="en-US" altLang="ko-KR" dirty="0">
-              <a:solidFill>
-                <a:sysClr val="windowText" lastClr="000000"/>
-              </a:solidFill>
-            </a:endParaRPr>
-          </a:p>
-          <a:p>
-            <a:pPr algn="ctr"/>
-            <a:endParaRPr kumimoji="1" lang="en-US" altLang="ko-KR" dirty="0">
-              <a:solidFill>
-                <a:sysClr val="windowText" lastClr="000000"/>
-              </a:solidFill>
-            </a:endParaRPr>
-          </a:p>
-          <a:p>
-            <a:pPr algn="ctr"/>
-            <a:endParaRPr kumimoji="1" lang="en-US" altLang="ko-KR" dirty="0">
-              <a:solidFill>
-                <a:sysClr val="windowText" lastClr="000000"/>
-              </a:solidFill>
-            </a:endParaRPr>
-          </a:p>
-          <a:p>
-            <a:pPr algn="ctr"/>
-            <a:endParaRPr kumimoji="1" lang="ko-KR" altLang="en-US" dirty="0">
-              <a:solidFill>
-                <a:sysClr val="windowText" lastClr="000000"/>
-              </a:solidFill>
-            </a:endParaRPr>
-          </a:p>
         </p:txBody>
       </p:sp>
       <p:pic>
         <p:nvPicPr>
-          <p:cNvPr id="25" name="그림 24" descr="폰트, 그래픽, 로고, 텍스트이(가) 표시된 사진&#10;&#10;AI 생성 콘텐츠는 정확하지 않을 수 있습니다.">
-            <a:extLst>
-              <a:ext uri="{FF2B5EF4-FFF2-40B4-BE49-F238E27FC236}">
-                <a16:creationId xmlns:a16="http://schemas.microsoft.com/office/drawing/2014/main" id="{205F256C-D59B-6695-7EFD-3463B18541D6}"/>
+          <p:cNvPr id="27" name="그림 26" descr="폰트, 로고, 그래픽, 타이포그래피이(가) 표시된 사진&#10;&#10;AI 생성 콘텐츠는 정확하지 않을 수 있습니다.">
+            <a:extLst>
+              <a:ext uri="{FF2B5EF4-FFF2-40B4-BE49-F238E27FC236}">
+                <a16:creationId xmlns:a16="http://schemas.microsoft.com/office/drawing/2014/main" id="{E0EFC234-BE52-A6F7-5428-AAA2177AF8B3}"/>
               </a:ext>
             </a:extLst>
           </p:cNvPr>
@@ -4921,37 +4855,7 @@
         </p:blipFill>
         <p:spPr>
           <a:xfrm>
-            <a:off x="1481808" y="4635352"/>
-            <a:ext cx="1246927" cy="280174"/>
-          </a:xfrm>
-          <a:prstGeom prst="rect">
-            <a:avLst/>
-          </a:prstGeom>
-        </p:spPr>
-      </p:pic>
-      <p:pic>
-        <p:nvPicPr>
-          <p:cNvPr id="27" name="그림 26" descr="폰트, 로고, 그래픽, 타이포그래피이(가) 표시된 사진&#10;&#10;AI 생성 콘텐츠는 정확하지 않을 수 있습니다.">
-            <a:extLst>
-              <a:ext uri="{FF2B5EF4-FFF2-40B4-BE49-F238E27FC236}">
-                <a16:creationId xmlns:a16="http://schemas.microsoft.com/office/drawing/2014/main" id="{E0EFC234-BE52-A6F7-5428-AAA2177AF8B3}"/>
-              </a:ext>
-            </a:extLst>
-          </p:cNvPr>
-          <p:cNvPicPr>
-            <a:picLocks noChangeAspect="1"/>
-          </p:cNvPicPr>
-          <p:nvPr/>
-        </p:nvPicPr>
-        <p:blipFill>
-          <a:blip r:embed="rId7"/>
-          <a:stretch>
-            <a:fillRect/>
-          </a:stretch>
-        </p:blipFill>
-        <p:spPr>
-          <a:xfrm>
-            <a:off x="3184732" y="4585117"/>
+            <a:off x="2446781" y="4959978"/>
             <a:ext cx="1222349" cy="380644"/>
           </a:xfrm>
           <a:prstGeom prst="rect">
@@ -4974,7 +4878,7 @@
           <p:nvPr/>
         </p:nvPicPr>
         <p:blipFill>
-          <a:blip r:embed="rId8"/>
+          <a:blip r:embed="rId7"/>
           <a:stretch>
             <a:fillRect/>
           </a:stretch>
@@ -5004,7 +4908,7 @@
           <p:nvPr/>
         </p:nvPicPr>
         <p:blipFill>
-          <a:blip r:embed="rId9"/>
+          <a:blip r:embed="rId8"/>
           <a:stretch>
             <a:fillRect/>
           </a:stretch>
@@ -5034,7 +4938,7 @@
           <p:nvPr/>
         </p:nvPicPr>
         <p:blipFill>
-          <a:blip r:embed="rId10"/>
+          <a:blip r:embed="rId9"/>
           <a:stretch>
             <a:fillRect/>
           </a:stretch>
@@ -5043,6 +4947,36 @@
           <a:xfrm>
             <a:off x="8653688" y="4937041"/>
             <a:ext cx="2124675" cy="757310"/>
+          </a:xfrm>
+          <a:prstGeom prst="rect">
+            <a:avLst/>
+          </a:prstGeom>
+        </p:spPr>
+      </p:pic>
+      <p:pic>
+        <p:nvPicPr>
+          <p:cNvPr id="12" name="그림 11" descr="텍스트, 폰트, 스크린샷이(가) 표시된 사진&#10;&#10;AI 생성 콘텐츠는 정확하지 않을 수 있습니다.">
+            <a:extLst>
+              <a:ext uri="{FF2B5EF4-FFF2-40B4-BE49-F238E27FC236}">
+                <a16:creationId xmlns:a16="http://schemas.microsoft.com/office/drawing/2014/main" id="{EAEBF510-9D19-2FDA-29DA-02AF8708E8AD}"/>
+              </a:ext>
+            </a:extLst>
+          </p:cNvPr>
+          <p:cNvPicPr>
+            <a:picLocks noChangeAspect="1"/>
+          </p:cNvPicPr>
+          <p:nvPr/>
+        </p:nvPicPr>
+        <p:blipFill>
+          <a:blip r:embed="rId10"/>
+          <a:stretch>
+            <a:fillRect/>
+          </a:stretch>
+        </p:blipFill>
+        <p:spPr>
+          <a:xfrm>
+            <a:off x="2446781" y="3752554"/>
+            <a:ext cx="1880420" cy="538743"/>
           </a:xfrm>
           <a:prstGeom prst="rect">
             <a:avLst/>

</xml_diff>